<commit_message>
Small tweaks and fixes
</commit_message>
<xml_diff>
--- a/NeuralNets (under the hood)/Neural Network Math.pptx
+++ b/NeuralNets (under the hood)/Neural Network Math.pptx
@@ -21172,7 +21172,7 @@
         </p:blipFill>
         <p:spPr>
           <a:xfrm>
-            <a:off x="345900" y="2235675"/>
+            <a:off x="345900" y="2388075"/>
             <a:ext cx="4699000" cy="2286000"/>
           </a:xfrm>
           <a:prstGeom prst="rect">
@@ -21460,7 +21460,10 @@
               <a:buNone/>
             </a:pPr>
             <a:r>
-              <a:rPr lang="en">
+              <a:rPr b="1" lang="en">
+                <a:solidFill>
+                  <a:schemeClr val="accent3"/>
+                </a:solidFill>
                 <a:latin typeface="Proxima Nova"/>
                 <a:ea typeface="Proxima Nova"/>
                 <a:cs typeface="Proxima Nova"/>
@@ -21468,7 +21471,10 @@
               </a:rPr>
               <a:t>Possible multiple correct paths through the network </a:t>
             </a:r>
-            <a:endParaRPr>
+            <a:endParaRPr b="1">
+              <a:solidFill>
+                <a:schemeClr val="accent3"/>
+              </a:solidFill>
               <a:latin typeface="Proxima Nova"/>
               <a:ea typeface="Proxima Nova"/>
               <a:cs typeface="Proxima Nova"/>
@@ -21689,7 +21695,7 @@
                 <a:cs typeface="Alfa Slab One"/>
                 <a:sym typeface="Alfa Slab One"/>
               </a:rPr>
-              <a:t>Independent Identically Distributed	</a:t>
+              <a:t>Independent       Identically       Distributed	</a:t>
             </a:r>
             <a:endParaRPr b="0" i="0" sz="1800" u="none" cap="none" strike="noStrike">
               <a:solidFill>
@@ -21873,7 +21879,23 @@
                 <a:cs typeface="Proxima Nova"/>
                 <a:sym typeface="Proxima Nova"/>
               </a:rPr>
-              <a:t>Identically Distributed and balanced</a:t>
+              <a:t>Identically Distributed and </a:t>
+            </a:r>
+            <a:r>
+              <a:rPr lang="en" sz="1400"/>
+              <a:t>B</a:t>
+            </a:r>
+            <a:r>
+              <a:rPr b="0" i="0" lang="en" sz="1400" u="none" cap="none" strike="noStrike">
+                <a:solidFill>
+                  <a:schemeClr val="dk2"/>
+                </a:solidFill>
+                <a:latin typeface="Proxima Nova"/>
+                <a:ea typeface="Proxima Nova"/>
+                <a:cs typeface="Proxima Nova"/>
+                <a:sym typeface="Proxima Nova"/>
+              </a:rPr>
+              <a:t>alanced</a:t>
             </a:r>
             <a:endParaRPr b="0" i="0" sz="1400" u="none" cap="none" strike="noStrike">
               <a:solidFill>
@@ -21913,7 +21935,11 @@
                 <a:cs typeface="Proxima Nova"/>
                 <a:sym typeface="Proxima Nova"/>
               </a:rPr>
-              <a:t>training, validation, test data</a:t>
+              <a:t>training, validation, test data all have same statistical</a:t>
+            </a:r>
+            <a:r>
+              <a:rPr lang="en" sz="1400"/>
+              <a:t>s</a:t>
             </a:r>
             <a:endParaRPr b="0" i="0" sz="1400" u="none" cap="none" strike="noStrike">
               <a:solidFill>
@@ -21943,6 +21969,10 @@
               <a:buFont typeface="Proxima Nova"/>
               <a:buChar char="-"/>
             </a:pPr>
+            <a:r>
+              <a:rPr lang="en" sz="1400"/>
+              <a:t>balanced </a:t>
+            </a:r>
             <a:r>
               <a:rPr b="0" i="0" lang="en" sz="1400" u="none" cap="none" strike="noStrike">
                 <a:solidFill>
@@ -22539,16 +22569,12 @@
               <a:buNone/>
             </a:pPr>
             <a:r>
-              <a:rPr b="0" i="0" lang="en" sz="1800" u="none" cap="none" strike="noStrike">
+              <a:rPr lang="en" sz="1800">
                 <a:solidFill>
                   <a:schemeClr val="accent5"/>
                 </a:solidFill>
-                <a:latin typeface="Alfa Slab One"/>
-                <a:ea typeface="Alfa Slab One"/>
-                <a:cs typeface="Alfa Slab One"/>
-                <a:sym typeface="Alfa Slab One"/>
               </a:rPr>
-              <a:t>The Task (Goals)</a:t>
+              <a:t>Goals ( Cost functions )</a:t>
             </a:r>
             <a:endParaRPr b="0" i="0" sz="1800" u="none" cap="none" strike="noStrike">
               <a:solidFill>
@@ -22986,7 +23012,7 @@
                 <a:cs typeface="Alfa Slab One"/>
                 <a:sym typeface="Alfa Slab One"/>
               </a:rPr>
-              <a:t>The Performance Measure ( Cost function)</a:t>
+              <a:t>The Performance Measure </a:t>
             </a:r>
             <a:endParaRPr b="0" i="0" sz="1800" u="none" cap="none" strike="noStrike">
               <a:solidFill>
@@ -23127,14 +23153,14 @@
             <a:r>
               <a:rPr b="1" i="0" lang="en" sz="1400" u="none" cap="none" strike="noStrike">
                 <a:solidFill>
-                  <a:schemeClr val="dk2"/>
+                  <a:schemeClr val="accent3"/>
                 </a:solidFill>
               </a:rPr>
               <a:t>~ 10% of data is held out to be used as a test after training is done</a:t>
             </a:r>
             <a:endParaRPr b="1" i="0" sz="1400" u="none" cap="none" strike="noStrike">
               <a:solidFill>
-                <a:schemeClr val="dk2"/>
+                <a:schemeClr val="accent3"/>
               </a:solidFill>
             </a:endParaRPr>
           </a:p>
@@ -23357,16 +23383,7 @@
               <a:buNone/>
             </a:pPr>
             <a:r>
-              <a:rPr b="0" i="0" lang="en" sz="1400" u="none" cap="none" strike="noStrike">
-                <a:solidFill>
-                  <a:schemeClr val="dk2"/>
-                </a:solidFill>
-                <a:latin typeface="Proxima Nova"/>
-                <a:ea typeface="Proxima Nova"/>
-                <a:cs typeface="Proxima Nova"/>
-                <a:sym typeface="Proxima Nova"/>
-              </a:rPr>
-              <a:t>Training, testing, validation data must be statistically similar</a:t>
+              <a:t/>
             </a:r>
             <a:endParaRPr b="0" i="0" sz="1400" u="none" cap="none" strike="noStrike">
               <a:solidFill>
@@ -23558,26 +23575,10 @@
               <a:buNone/>
             </a:pPr>
             <a:r>
-              <a:rPr b="0" i="0" lang="en" sz="1400" u="none" cap="none" strike="noStrike">
-                <a:solidFill>
-                  <a:schemeClr val="accent3"/>
-                </a:solidFill>
-                <a:latin typeface="Proxima Nova"/>
-                <a:ea typeface="Proxima Nova"/>
-                <a:cs typeface="Proxima Nova"/>
-                <a:sym typeface="Proxima Nova"/>
-              </a:rPr>
+              <a:rPr b="1" i="0" lang="en" sz="1400" u="none" cap="none" strike="noStrike"/>
               <a:t>MSE = (target - predicted)^2  = Bias^2 + Variance + noise</a:t>
             </a:r>
-            <a:endParaRPr b="0" i="0" sz="1400" u="none" cap="none" strike="noStrike">
-              <a:solidFill>
-                <a:schemeClr val="accent3"/>
-              </a:solidFill>
-              <a:latin typeface="Proxima Nova"/>
-              <a:ea typeface="Proxima Nova"/>
-              <a:cs typeface="Proxima Nova"/>
-              <a:sym typeface="Proxima Nova"/>
-            </a:endParaRPr>
+            <a:endParaRPr b="1" i="0" sz="1400" u="none" cap="none" strike="noStrike"/>
           </a:p>
         </p:txBody>
       </p:sp>
@@ -23948,9 +23949,9 @@
               <a:buNone/>
             </a:pPr>
             <a:r>
-              <a:rPr b="0" i="0" lang="en" sz="1400" u="none" cap="none" strike="noStrike">
-                <a:solidFill>
-                  <a:schemeClr val="accent3"/>
+              <a:rPr b="0" i="0" lang="en" sz="1200" u="none" cap="none" strike="noStrike">
+                <a:solidFill>
+                  <a:schemeClr val="accent2"/>
                 </a:solidFill>
                 <a:latin typeface="Proxima Nova"/>
                 <a:ea typeface="Proxima Nova"/>
@@ -23959,9 +23960,9 @@
               </a:rPr>
               <a:t>Coin toss: 2 possibilities (heads, tails) == 1 bit</a:t>
             </a:r>
-            <a:endParaRPr b="0" i="0" sz="1400" u="none" cap="none" strike="noStrike">
+            <a:endParaRPr b="0" i="0" sz="1200" u="none" cap="none" strike="noStrike">
               <a:solidFill>
-                <a:schemeClr val="accent3"/>
+                <a:schemeClr val="accent2"/>
               </a:solidFill>
               <a:latin typeface="Proxima Nova"/>
               <a:ea typeface="Proxima Nova"/>
@@ -23988,9 +23989,9 @@
               <a:buNone/>
             </a:pPr>
             <a:r>
-              <a:rPr b="0" i="0" lang="en" sz="1400" u="none" cap="none" strike="noStrike">
-                <a:solidFill>
-                  <a:schemeClr val="accent3"/>
+              <a:rPr b="0" i="0" lang="en" sz="1200" u="none" cap="none" strike="noStrike">
+                <a:solidFill>
+                  <a:schemeClr val="accent2"/>
                 </a:solidFill>
                 <a:latin typeface="Proxima Nova"/>
                 <a:ea typeface="Proxima Nova"/>
@@ -23999,9 +24000,9 @@
               </a:rPr>
               <a:t>Entropy = - Sum( (½) * log(½) + (½) * log(½) )</a:t>
             </a:r>
-            <a:endParaRPr b="0" i="0" sz="1400" u="none" cap="none" strike="noStrike">
+            <a:endParaRPr b="0" i="0" sz="1200" u="none" cap="none" strike="noStrike">
               <a:solidFill>
-                <a:schemeClr val="accent3"/>
+                <a:schemeClr val="accent2"/>
               </a:solidFill>
               <a:latin typeface="Proxima Nova"/>
               <a:ea typeface="Proxima Nova"/>
@@ -24028,9 +24029,9 @@
               <a:buNone/>
             </a:pPr>
             <a:r>
-              <a:rPr b="0" i="0" lang="en" sz="1400" u="none" cap="none" strike="noStrike">
-                <a:solidFill>
-                  <a:schemeClr val="accent3"/>
+              <a:rPr b="0" i="0" lang="en" sz="1200" u="none" cap="none" strike="noStrike">
+                <a:solidFill>
+                  <a:schemeClr val="accent2"/>
                 </a:solidFill>
                 <a:latin typeface="Proxima Nova"/>
                 <a:ea typeface="Proxima Nova"/>
@@ -24039,9 +24040,9 @@
               </a:rPr>
               <a:t>Entropy = - ( ½ * -1) + (½ * -1) = -(-½ - ½) = 1</a:t>
             </a:r>
-            <a:endParaRPr b="0" i="0" sz="1400" u="none" cap="none" strike="noStrike">
+            <a:endParaRPr b="0" i="0" sz="1200" u="none" cap="none" strike="noStrike">
               <a:solidFill>
-                <a:schemeClr val="accent3"/>
+                <a:schemeClr val="accent2"/>
               </a:solidFill>
               <a:latin typeface="Proxima Nova"/>
               <a:ea typeface="Proxima Nova"/>
@@ -24068,9 +24069,9 @@
               <a:buNone/>
             </a:pPr>
             <a:r>
-              <a:rPr b="0" i="0" lang="en" sz="1400" u="none" cap="none" strike="noStrike">
-                <a:solidFill>
-                  <a:schemeClr val="accent3"/>
+              <a:rPr b="0" i="0" lang="en" sz="1200" u="none" cap="none" strike="noStrike">
+                <a:solidFill>
+                  <a:schemeClr val="accent2"/>
                 </a:solidFill>
                 <a:latin typeface="Proxima Nova"/>
                 <a:ea typeface="Proxima Nova"/>
@@ -24079,9 +24080,9 @@
               </a:rPr>
               <a:t>Coin toss: 2 possibilities (heads ⅓, tails ⅔)</a:t>
             </a:r>
-            <a:endParaRPr b="0" i="0" sz="1400" u="none" cap="none" strike="noStrike">
+            <a:endParaRPr b="0" i="0" sz="1200" u="none" cap="none" strike="noStrike">
               <a:solidFill>
-                <a:schemeClr val="accent3"/>
+                <a:schemeClr val="accent2"/>
               </a:solidFill>
               <a:latin typeface="Proxima Nova"/>
               <a:ea typeface="Proxima Nova"/>
@@ -24108,9 +24109,9 @@
               <a:buNone/>
             </a:pPr>
             <a:r>
-              <a:rPr b="0" i="0" lang="en" sz="1400" u="none" cap="none" strike="noStrike">
-                <a:solidFill>
-                  <a:schemeClr val="accent3"/>
+              <a:rPr b="0" i="0" lang="en" sz="1200" u="none" cap="none" strike="noStrike">
+                <a:solidFill>
+                  <a:schemeClr val="accent2"/>
                 </a:solidFill>
                 <a:latin typeface="Proxima Nova"/>
                 <a:ea typeface="Proxima Nova"/>
@@ -24119,9 +24120,9 @@
               </a:rPr>
               <a:t>Entropy = -(⅓ * log(⅓)  + ⅔ * log(⅔) ) = 0.89</a:t>
             </a:r>
-            <a:endParaRPr b="0" i="0" sz="1400" u="none" cap="none" strike="noStrike">
+            <a:endParaRPr b="0" i="0" sz="1200" u="none" cap="none" strike="noStrike">
               <a:solidFill>
-                <a:schemeClr val="accent3"/>
+                <a:schemeClr val="accent2"/>
               </a:solidFill>
               <a:latin typeface="Proxima Nova"/>
               <a:ea typeface="Proxima Nova"/>
@@ -24678,7 +24679,7 @@
             <a:r>
               <a:rPr b="0" i="0" lang="en" sz="1400" u="none" cap="none" strike="noStrike">
                 <a:solidFill>
-                  <a:schemeClr val="dk2"/>
+                  <a:schemeClr val="accent1"/>
                 </a:solidFill>
                 <a:latin typeface="Proxima Nova"/>
                 <a:ea typeface="Proxima Nova"/>
@@ -24689,7 +24690,7 @@
             </a:r>
             <a:endParaRPr b="0" i="0" sz="1400" u="none" cap="none" strike="noStrike">
               <a:solidFill>
-                <a:schemeClr val="dk2"/>
+                <a:schemeClr val="accent1"/>
               </a:solidFill>
               <a:latin typeface="Proxima Nova"/>
               <a:ea typeface="Proxima Nova"/>
@@ -24720,7 +24721,7 @@
             </a:r>
             <a:endParaRPr b="0" i="0" sz="1400" u="none" cap="none" strike="noStrike">
               <a:solidFill>
-                <a:schemeClr val="dk2"/>
+                <a:schemeClr val="accent1"/>
               </a:solidFill>
               <a:latin typeface="Proxima Nova"/>
               <a:ea typeface="Proxima Nova"/>
@@ -24749,7 +24750,7 @@
             <a:r>
               <a:rPr b="0" i="0" lang="en" sz="1400" u="none" cap="none" strike="noStrike">
                 <a:solidFill>
-                  <a:schemeClr val="dk2"/>
+                  <a:schemeClr val="accent1"/>
                 </a:solidFill>
                 <a:latin typeface="Proxima Nova"/>
                 <a:ea typeface="Proxima Nova"/>
@@ -24760,7 +24761,7 @@
             </a:r>
             <a:endParaRPr b="0" i="0" sz="1400" u="none" cap="none" strike="noStrike">
               <a:solidFill>
-                <a:schemeClr val="dk2"/>
+                <a:schemeClr val="accent1"/>
               </a:solidFill>
               <a:latin typeface="Proxima Nova"/>
               <a:ea typeface="Proxima Nova"/>
@@ -24789,7 +24790,7 @@
             <a:r>
               <a:rPr b="0" i="0" lang="en" sz="1400" u="none" cap="none" strike="noStrike">
                 <a:solidFill>
-                  <a:schemeClr val="dk2"/>
+                  <a:schemeClr val="accent1"/>
                 </a:solidFill>
                 <a:latin typeface="Proxima Nova"/>
                 <a:ea typeface="Proxima Nova"/>
@@ -24800,7 +24801,7 @@
             </a:r>
             <a:endParaRPr b="0" i="0" sz="1400" u="none" cap="none" strike="noStrike">
               <a:solidFill>
-                <a:schemeClr val="dk2"/>
+                <a:schemeClr val="accent1"/>
               </a:solidFill>
               <a:latin typeface="Proxima Nova"/>
               <a:ea typeface="Proxima Nova"/>
@@ -24820,7 +24821,7 @@
                 <a:spcPts val="0"/>
               </a:spcAft>
               <a:buClr>
-                <a:schemeClr val="dk2"/>
+                <a:schemeClr val="accent1"/>
               </a:buClr>
               <a:buSzPts val="1400"/>
               <a:buFont typeface="Proxima Nova"/>
@@ -24829,18 +24830,26 @@
             <a:r>
               <a:rPr b="0" i="0" lang="en" sz="1400" u="none" cap="none" strike="noStrike">
                 <a:solidFill>
-                  <a:schemeClr val="dk2"/>
+                  <a:schemeClr val="accent1"/>
                 </a:solidFill>
                 <a:latin typeface="Proxima Nova"/>
                 <a:ea typeface="Proxima Nova"/>
                 <a:cs typeface="Proxima Nova"/>
                 <a:sym typeface="Proxima Nova"/>
               </a:rPr>
-              <a:t>not a distance measure !</a:t>
+              <a:t>not a distance measure </a:t>
+            </a:r>
+            <a:r>
+              <a:rPr lang="en" sz="1400">
+                <a:solidFill>
+                  <a:schemeClr val="accent1"/>
+                </a:solidFill>
+              </a:rPr>
+              <a:t>( you can reverse your Ps and Qs but keep them consistent )</a:t>
             </a:r>
             <a:endParaRPr b="0" i="0" sz="1400" u="none" cap="none" strike="noStrike">
               <a:solidFill>
-                <a:schemeClr val="dk2"/>
+                <a:schemeClr val="accent1"/>
               </a:solidFill>
               <a:latin typeface="Proxima Nova"/>
               <a:ea typeface="Proxima Nova"/>
@@ -25005,7 +25014,7 @@
         </p:blipFill>
         <p:spPr>
           <a:xfrm>
-            <a:off x="6179050" y="2232425"/>
+            <a:off x="6525525" y="1797650"/>
             <a:ext cx="2419150" cy="909000"/>
           </a:xfrm>
           <a:prstGeom prst="rect">
@@ -25295,7 +25304,7 @@
             </a:pPr>
             <a:r>
               <a:rPr lang="en"/>
-              <a:t>Cross entropy = entropy + KL Divergence</a:t>
+              <a:t>Cross entropy = Entropy + KL Divergence</a:t>
             </a:r>
             <a:endParaRPr/>
           </a:p>
@@ -25319,7 +25328,7 @@
             </a:pPr>
             <a:r>
               <a:rPr lang="en"/>
-              <a:t>entropy = minimum bits needed to transmit actual information</a:t>
+              <a:t>Entropy = minimum bits needed to transmit actual information</a:t>
             </a:r>
             <a:endParaRPr/>
           </a:p>
@@ -26877,7 +26886,47 @@
                 <a:cs typeface="Alfa Slab One"/>
                 <a:sym typeface="Alfa Slab One"/>
               </a:rPr>
-              <a:t>MLE (frequentist) vs MAP (bayesian)</a:t>
+              <a:t>MLE (</a:t>
+            </a:r>
+            <a:r>
+              <a:rPr lang="en" sz="1800">
+                <a:solidFill>
+                  <a:schemeClr val="accent5"/>
+                </a:solidFill>
+              </a:rPr>
+              <a:t>F</a:t>
+            </a:r>
+            <a:r>
+              <a:rPr b="0" i="0" lang="en" sz="1800" u="none" cap="none" strike="noStrike">
+                <a:solidFill>
+                  <a:schemeClr val="accent5"/>
+                </a:solidFill>
+                <a:latin typeface="Alfa Slab One"/>
+                <a:ea typeface="Alfa Slab One"/>
+                <a:cs typeface="Alfa Slab One"/>
+                <a:sym typeface="Alfa Slab One"/>
+              </a:rPr>
+              <a:t>requentist) vs MAP (</a:t>
+            </a:r>
+            <a:r>
+              <a:rPr lang="en" sz="1800">
+                <a:solidFill>
+                  <a:schemeClr val="accent5"/>
+                </a:solidFill>
+              </a:rPr>
+              <a:t>B</a:t>
+            </a:r>
+            <a:r>
+              <a:rPr b="0" i="0" lang="en" sz="1800" u="none" cap="none" strike="noStrike">
+                <a:solidFill>
+                  <a:schemeClr val="accent5"/>
+                </a:solidFill>
+                <a:latin typeface="Alfa Slab One"/>
+                <a:ea typeface="Alfa Slab One"/>
+                <a:cs typeface="Alfa Slab One"/>
+                <a:sym typeface="Alfa Slab One"/>
+              </a:rPr>
+              <a:t>ayesian)</a:t>
             </a:r>
             <a:endParaRPr b="0" i="0" sz="1800" u="none" cap="none" strike="noStrike">
               <a:solidFill>
@@ -27056,25 +27105,25 @@
               <a:buNone/>
             </a:pPr>
             <a:r>
-              <a:rPr b="0" i="0" lang="en" sz="1400" u="none" cap="none" strike="noStrike">
+              <a:rPr b="1" lang="en" sz="1400"/>
+              <a:t>Frequentist</a:t>
+            </a:r>
+            <a:r>
+              <a:rPr b="1" i="0" lang="en" sz="1400" u="none" cap="none" strike="noStrike">
                 <a:solidFill>
                   <a:schemeClr val="dk2"/>
                 </a:solidFill>
-                <a:latin typeface="Proxima Nova"/>
-                <a:ea typeface="Proxima Nova"/>
-                <a:cs typeface="Proxima Nova"/>
-                <a:sym typeface="Proxima Nova"/>
               </a:rPr>
-              <a:t>MLE is a specific case of MAP</a:t>
-            </a:r>
-            <a:endParaRPr b="0" i="0" sz="1400" u="none" cap="none" strike="noStrike">
+              <a:t> is a specific case of </a:t>
+            </a:r>
+            <a:r>
+              <a:rPr b="1" lang="en" sz="1400"/>
+              <a:t>Bayesian</a:t>
+            </a:r>
+            <a:endParaRPr b="1" i="0" sz="1400" u="none" cap="none" strike="noStrike">
               <a:solidFill>
                 <a:schemeClr val="dk2"/>
               </a:solidFill>
-              <a:latin typeface="Proxima Nova"/>
-              <a:ea typeface="Proxima Nova"/>
-              <a:cs typeface="Proxima Nova"/>
-              <a:sym typeface="Proxima Nova"/>
             </a:endParaRPr>
           </a:p>
           <a:p>
@@ -28849,7 +28898,11 @@
                 <a:cs typeface="Proxima Nova"/>
                 <a:sym typeface="Proxima Nova"/>
               </a:rPr>
-              <a:t>L1 regularization</a:t>
+              <a:t>L1 regularization  ( city blocks </a:t>
+            </a:r>
+            <a:r>
+              <a:rPr lang="en" sz="1400"/>
+              <a:t>distance )</a:t>
             </a:r>
             <a:endParaRPr b="0" i="0" sz="1400" u="none" cap="none" strike="noStrike">
               <a:solidFill>
@@ -28889,7 +28942,11 @@
                 <a:cs typeface="Proxima Nova"/>
                 <a:sym typeface="Proxima Nova"/>
               </a:rPr>
-              <a:t>L2 regularization</a:t>
+              <a:t>L2 regularization ( as the cro</a:t>
+            </a:r>
+            <a:r>
+              <a:rPr lang="en" sz="1400"/>
+              <a:t>w flies distance )</a:t>
             </a:r>
             <a:endParaRPr b="0" i="0" sz="1400" u="none" cap="none" strike="noStrike">
               <a:solidFill>
@@ -31466,37 +31523,6 @@
               <a:buChar char="-"/>
             </a:pPr>
             <a:r>
-              <a:t/>
-            </a:r>
-            <a:endParaRPr b="0" i="0" sz="1400" u="none" cap="none" strike="noStrike">
-              <a:solidFill>
-                <a:schemeClr val="dk2"/>
-              </a:solidFill>
-              <a:latin typeface="Proxima Nova"/>
-              <a:ea typeface="Proxima Nova"/>
-              <a:cs typeface="Proxima Nova"/>
-              <a:sym typeface="Proxima Nova"/>
-            </a:endParaRPr>
-          </a:p>
-          <a:p>
-            <a:pPr indent="-317500" lvl="0" marL="457200" marR="0" rtl="0" algn="l">
-              <a:lnSpc>
-                <a:spcPct val="115000"/>
-              </a:lnSpc>
-              <a:spcBef>
-                <a:spcPts val="0"/>
-              </a:spcBef>
-              <a:spcAft>
-                <a:spcPts val="0"/>
-              </a:spcAft>
-              <a:buClr>
-                <a:schemeClr val="dk2"/>
-              </a:buClr>
-              <a:buSzPts val="1400"/>
-              <a:buFont typeface="Proxima Nova"/>
-              <a:buChar char="-"/>
-            </a:pPr>
-            <a:r>
               <a:rPr b="0" i="0" lang="en" sz="1400" u="none" cap="none" strike="noStrike">
                 <a:solidFill>
                   <a:schemeClr val="dk2"/>
@@ -31506,7 +31532,23 @@
                 <a:cs typeface="Proxima Nova"/>
                 <a:sym typeface="Proxima Nova"/>
               </a:rPr>
-              <a:t>softmax ( used in last layer to scale values so they sum up to 1, used in last layer to give probability )</a:t>
+              <a:t>softmax ( used in last layer to scale values  to 1, used in last layer to give multi</a:t>
+            </a:r>
+            <a:r>
+              <a:rPr lang="en" sz="1400"/>
+              <a:t>-class </a:t>
+            </a:r>
+            <a:r>
+              <a:rPr b="0" i="0" lang="en" sz="1400" u="none" cap="none" strike="noStrike">
+                <a:solidFill>
+                  <a:schemeClr val="dk2"/>
+                </a:solidFill>
+                <a:latin typeface="Proxima Nova"/>
+                <a:ea typeface="Proxima Nova"/>
+                <a:cs typeface="Proxima Nova"/>
+                <a:sym typeface="Proxima Nova"/>
+              </a:rPr>
+              <a:t>probability )</a:t>
             </a:r>
             <a:endParaRPr b="0" i="0" sz="1400" u="none" cap="none" strike="noStrike">
               <a:solidFill>
@@ -31787,7 +31829,7 @@
                 <a:cs typeface="Proxima Nova"/>
                 <a:sym typeface="Proxima Nova"/>
               </a:rPr>
-              <a:t>Validation data must be future data</a:t>
+              <a:t>Validation data must be future data </a:t>
             </a:r>
             <a:endParaRPr b="0" i="0" sz="1400" u="none" cap="none" strike="noStrike">
               <a:solidFill>
@@ -31829,29 +31871,6 @@
               <a:cs typeface="Proxima Nova"/>
               <a:sym typeface="Proxima Nova"/>
             </a:endParaRPr>
-          </a:p>
-          <a:p>
-            <a:pPr indent="0" lvl="0" marL="0" marR="0" rtl="0" algn="l">
-              <a:lnSpc>
-                <a:spcPct val="115000"/>
-              </a:lnSpc>
-              <a:spcBef>
-                <a:spcPts val="1600"/>
-              </a:spcBef>
-              <a:spcAft>
-                <a:spcPts val="0"/>
-              </a:spcAft>
-              <a:buClr>
-                <a:schemeClr val="dk2"/>
-              </a:buClr>
-              <a:buSzPts val="1800"/>
-              <a:buFont typeface="Proxima Nova"/>
-              <a:buNone/>
-            </a:pPr>
-            <a:r>
-              <a:t/>
-            </a:r>
-            <a:endParaRPr sz="1400"/>
           </a:p>
           <a:p>
             <a:pPr indent="0" lvl="0" marL="0" marR="0" rtl="0" algn="l">
@@ -32013,7 +32032,7 @@
         </p:blipFill>
         <p:spPr>
           <a:xfrm>
-            <a:off x="4212225" y="1231549"/>
+            <a:off x="4212225" y="545749"/>
             <a:ext cx="4620075" cy="2435750"/>
           </a:xfrm>
           <a:prstGeom prst="rect">
@@ -34134,7 +34153,7 @@
                 <a:cs typeface="Proxima Nova"/>
                 <a:sym typeface="Proxima Nova"/>
               </a:rPr>
-              <a:t>Manning MEAP Books </a:t>
+              <a:t>Manning Books </a:t>
             </a:r>
             <a:r>
               <a:rPr b="0" i="0" lang="en" sz="1400" u="sng" cap="none" strike="noStrike">
@@ -34890,7 +34909,7 @@
                 <a:cs typeface="Proxima Nova"/>
                 <a:sym typeface="Proxima Nova"/>
               </a:rPr>
-              <a:t>Neural Network Zoo </a:t>
+              <a:t>WildML </a:t>
             </a:r>
             <a:r>
               <a:rPr b="0" i="0" lang="en" sz="1400" u="sng" cap="none" strike="noStrike">
@@ -34902,112 +34921,6 @@
                 <a:cs typeface="Proxima Nova"/>
                 <a:sym typeface="Proxima Nova"/>
                 <a:hlinkClick r:id="rId5"/>
-              </a:rPr>
-              <a:t>http://www.asimovinstitute.org/neural-network-zoo/</a:t>
-            </a:r>
-            <a:endParaRPr b="0" i="0" sz="1400" u="none" cap="none" strike="noStrike">
-              <a:solidFill>
-                <a:schemeClr val="dk2"/>
-              </a:solidFill>
-              <a:latin typeface="Proxima Nova"/>
-              <a:ea typeface="Proxima Nova"/>
-              <a:cs typeface="Proxima Nova"/>
-              <a:sym typeface="Proxima Nova"/>
-            </a:endParaRPr>
-          </a:p>
-          <a:p>
-            <a:pPr indent="0" lvl="0" marL="0" marR="0" rtl="0" algn="l">
-              <a:lnSpc>
-                <a:spcPct val="115000"/>
-              </a:lnSpc>
-              <a:spcBef>
-                <a:spcPts val="1600"/>
-              </a:spcBef>
-              <a:spcAft>
-                <a:spcPts val="0"/>
-              </a:spcAft>
-              <a:buClr>
-                <a:schemeClr val="dk2"/>
-              </a:buClr>
-              <a:buSzPts val="1800"/>
-              <a:buFont typeface="Proxima Nova"/>
-              <a:buNone/>
-            </a:pPr>
-            <a:r>
-              <a:rPr b="0" i="0" lang="en" sz="1400" u="none" cap="none" strike="noStrike">
-                <a:solidFill>
-                  <a:schemeClr val="dk2"/>
-                </a:solidFill>
-                <a:latin typeface="Proxima Nova"/>
-                <a:ea typeface="Proxima Nova"/>
-                <a:cs typeface="Proxima Nova"/>
-                <a:sym typeface="Proxima Nova"/>
-              </a:rPr>
-              <a:t>Neural Network Playground </a:t>
-            </a:r>
-            <a:r>
-              <a:rPr b="0" i="0" lang="en" sz="1400" u="sng" cap="none" strike="noStrike">
-                <a:solidFill>
-                  <a:schemeClr val="hlink"/>
-                </a:solidFill>
-                <a:latin typeface="Proxima Nova"/>
-                <a:ea typeface="Proxima Nova"/>
-                <a:cs typeface="Proxima Nova"/>
-                <a:sym typeface="Proxima Nova"/>
-                <a:hlinkClick r:id="rId6"/>
-              </a:rPr>
-              <a:t>http://playground.tensorflow.org</a:t>
-            </a:r>
-            <a:endParaRPr b="0" i="0" sz="1400" u="none" cap="none" strike="noStrike">
-              <a:solidFill>
-                <a:schemeClr val="dk2"/>
-              </a:solidFill>
-              <a:latin typeface="Proxima Nova"/>
-              <a:ea typeface="Proxima Nova"/>
-              <a:cs typeface="Proxima Nova"/>
-              <a:sym typeface="Proxima Nova"/>
-            </a:endParaRPr>
-          </a:p>
-          <a:p>
-            <a:pPr indent="0" lvl="0" marL="0" marR="0" rtl="0" algn="l">
-              <a:lnSpc>
-                <a:spcPct val="115000"/>
-              </a:lnSpc>
-              <a:spcBef>
-                <a:spcPts val="1600"/>
-              </a:spcBef>
-              <a:spcAft>
-                <a:spcPts val="0"/>
-              </a:spcAft>
-              <a:buClr>
-                <a:schemeClr val="dk2"/>
-              </a:buClr>
-              <a:buSzPts val="1800"/>
-              <a:buFont typeface="Proxima Nova"/>
-              <a:buNone/>
-            </a:pPr>
-            <a:r>
-              <a:rPr b="0" i="0" lang="en" sz="1400" u="none" cap="none" strike="noStrike">
-                <a:solidFill>
-                  <a:schemeClr val="dk2"/>
-                </a:solidFill>
-                <a:latin typeface="Proxima Nova"/>
-                <a:ea typeface="Proxima Nova"/>
-                <a:cs typeface="Proxima Nova"/>
-                <a:sym typeface="Proxima Nova"/>
-              </a:rPr>
-              <a:t>WildML </a:t>
-            </a:r>
-            <a:r>
-              <a:rPr b="0" i="0" lang="en" sz="1400" u="sng" cap="none" strike="noStrike">
-                <a:solidFill>
-                  <a:schemeClr val="hlink"/>
-                </a:solidFill>
-                <a:latin typeface="Proxima Nova"/>
-                <a:ea typeface="Proxima Nova"/>
-                <a:cs typeface="Proxima Nova"/>
-                <a:sym typeface="Proxima Nova"/>
-                <a:hlinkClick r:id="rId7"/>
               </a:rPr>
               <a:t>http://www.wildml.com/</a:t>
             </a:r>
@@ -35481,7 +35394,23 @@
                 <a:cs typeface="Proxima Nova"/>
                 <a:sym typeface="Proxima Nova"/>
               </a:rPr>
-              <a:t>prediction = dot(w.T, x)</a:t>
+              <a:t>prediction = activation_functi</a:t>
+            </a:r>
+            <a:r>
+              <a:rPr lang="en" sz="1400"/>
+              <a:t>on (</a:t>
+            </a:r>
+            <a:r>
+              <a:rPr b="0" i="0" lang="en" sz="1400" u="none" cap="none" strike="noStrike">
+                <a:solidFill>
+                  <a:schemeClr val="dk2"/>
+                </a:solidFill>
+                <a:latin typeface="Proxima Nova"/>
+                <a:ea typeface="Proxima Nova"/>
+                <a:cs typeface="Proxima Nova"/>
+                <a:sym typeface="Proxima Nova"/>
+              </a:rPr>
+              <a:t>dot(w.T, x))</a:t>
             </a:r>
             <a:endParaRPr b="0" i="0" sz="1400" u="none" cap="none" strike="noStrike">
               <a:solidFill>
@@ -35552,7 +35481,16 @@
               <a:buNone/>
             </a:pPr>
             <a:r>
-              <a:t/>
+              <a:rPr b="0" i="0" lang="en" sz="1400" u="none" cap="none" strike="noStrike">
+                <a:solidFill>
+                  <a:schemeClr val="dk2"/>
+                </a:solidFill>
+                <a:latin typeface="Proxima Nova"/>
+                <a:ea typeface="Proxima Nova"/>
+                <a:cs typeface="Proxima Nova"/>
+                <a:sym typeface="Proxima Nova"/>
+              </a:rPr>
+              <a:t>Solve for unknown f(x)</a:t>
             </a:r>
             <a:endParaRPr b="0" i="0" sz="1400" u="none" cap="none" strike="noStrike">
               <a:solidFill>
@@ -35583,26 +35521,9 @@
               <a:buNone/>
             </a:pPr>
             <a:r>
-              <a:rPr b="0" i="0" lang="en" sz="1400" u="none" cap="none" strike="noStrike">
-                <a:solidFill>
-                  <a:schemeClr val="dk2"/>
-                </a:solidFill>
-                <a:latin typeface="Proxima Nova"/>
-                <a:ea typeface="Proxima Nova"/>
-                <a:cs typeface="Proxima Nova"/>
-                <a:sym typeface="Proxima Nova"/>
-              </a:rPr>
-              <a:t>Solve for unknown f(x)</a:t>
-            </a:r>
-            <a:endParaRPr b="0" i="0" sz="1400" u="none" cap="none" strike="noStrike">
-              <a:solidFill>
-                <a:schemeClr val="dk2"/>
-              </a:solidFill>
-              <a:latin typeface="Proxima Nova"/>
-              <a:ea typeface="Proxima Nova"/>
-              <a:cs typeface="Proxima Nova"/>
-              <a:sym typeface="Proxima Nova"/>
-            </a:endParaRPr>
+              <a:t/>
+            </a:r>
+            <a:endParaRPr sz="1400"/>
           </a:p>
           <a:p>
             <a:pPr indent="0" lvl="0" marL="0" marR="0" rtl="0" algn="l">
@@ -35613,7 +35534,7 @@
                 <a:spcPts val="1600"/>
               </a:spcBef>
               <a:spcAft>
-                <a:spcPts val="0"/>
+                <a:spcPts val="1600"/>
               </a:spcAft>
               <a:buClr>
                 <a:schemeClr val="dk2"/>
@@ -35623,136 +35544,7 @@
               <a:buNone/>
             </a:pPr>
             <a:r>
-              <a:rPr b="0" i="0" lang="en" sz="1400" u="none" cap="none" strike="noStrike">
-                <a:solidFill>
-                  <a:schemeClr val="dk2"/>
-                </a:solidFill>
-                <a:latin typeface="Proxima Nova"/>
-                <a:ea typeface="Proxima Nova"/>
-                <a:cs typeface="Proxima Nova"/>
-                <a:sym typeface="Proxima Nova"/>
-              </a:rPr>
-              <a:t>J(w) = ||y - dot(w.T, x)||^2</a:t>
-            </a:r>
-            <a:endParaRPr b="0" i="0" sz="1400" u="none" cap="none" strike="noStrike">
-              <a:solidFill>
-                <a:schemeClr val="dk2"/>
-              </a:solidFill>
-              <a:latin typeface="Proxima Nova"/>
-              <a:ea typeface="Proxima Nova"/>
-              <a:cs typeface="Proxima Nova"/>
-              <a:sym typeface="Proxima Nova"/>
-            </a:endParaRPr>
-          </a:p>
-          <a:p>
-            <a:pPr indent="0" lvl="0" marL="0" marR="0" rtl="0" algn="l">
-              <a:lnSpc>
-                <a:spcPct val="115000"/>
-              </a:lnSpc>
-              <a:spcBef>
-                <a:spcPts val="1600"/>
-              </a:spcBef>
-              <a:spcAft>
-                <a:spcPts val="0"/>
-              </a:spcAft>
-              <a:buClr>
-                <a:schemeClr val="dk2"/>
-              </a:buClr>
-              <a:buSzPts val="1800"/>
-              <a:buFont typeface="Proxima Nova"/>
-              <a:buNone/>
-            </a:pPr>
-            <a:r>
-              <a:rPr b="0" i="0" lang="en" sz="1400" u="none" cap="none" strike="noStrike">
-                <a:solidFill>
-                  <a:schemeClr val="dk2"/>
-                </a:solidFill>
-                <a:latin typeface="Proxima Nova"/>
-                <a:ea typeface="Proxima Nova"/>
-                <a:cs typeface="Proxima Nova"/>
-                <a:sym typeface="Proxima Nova"/>
-              </a:rPr>
-              <a:t>Use derivative to find direction to change weights</a:t>
-            </a:r>
-            <a:endParaRPr b="0" i="0" sz="1400" u="none" cap="none" strike="noStrike">
-              <a:solidFill>
-                <a:schemeClr val="dk2"/>
-              </a:solidFill>
-              <a:latin typeface="Proxima Nova"/>
-              <a:ea typeface="Proxima Nova"/>
-              <a:cs typeface="Proxima Nova"/>
-              <a:sym typeface="Proxima Nova"/>
-            </a:endParaRPr>
-          </a:p>
-          <a:p>
-            <a:pPr indent="0" lvl="0" marL="0" marR="0" rtl="0" algn="l">
-              <a:lnSpc>
-                <a:spcPct val="115000"/>
-              </a:lnSpc>
-              <a:spcBef>
-                <a:spcPts val="1600"/>
-              </a:spcBef>
-              <a:spcAft>
-                <a:spcPts val="0"/>
-              </a:spcAft>
-              <a:buClr>
-                <a:schemeClr val="dk2"/>
-              </a:buClr>
-              <a:buSzPts val="1800"/>
-              <a:buFont typeface="Proxima Nova"/>
-              <a:buNone/>
-            </a:pPr>
-            <a:r>
-              <a:rPr b="0" i="0" lang="en" sz="1400" u="none" cap="none" strike="noStrike">
-                <a:solidFill>
-                  <a:schemeClr val="dk2"/>
-                </a:solidFill>
-                <a:latin typeface="Proxima Nova"/>
-                <a:ea typeface="Proxima Nova"/>
-                <a:cs typeface="Proxima Nova"/>
-                <a:sym typeface="Proxima Nova"/>
-              </a:rPr>
-              <a:t>dJ/dw =  2 * XTXw -2 * XTy</a:t>
-            </a:r>
-            <a:endParaRPr b="0" i="0" sz="1400" u="none" cap="none" strike="noStrike">
-              <a:solidFill>
-                <a:schemeClr val="dk2"/>
-              </a:solidFill>
-              <a:latin typeface="Proxima Nova"/>
-              <a:ea typeface="Proxima Nova"/>
-              <a:cs typeface="Proxima Nova"/>
-              <a:sym typeface="Proxima Nova"/>
-            </a:endParaRPr>
-          </a:p>
-          <a:p>
-            <a:pPr indent="0" lvl="0" marL="0" marR="0" rtl="0" algn="l">
-              <a:lnSpc>
-                <a:spcPct val="115000"/>
-              </a:lnSpc>
-              <a:spcBef>
-                <a:spcPts val="1600"/>
-              </a:spcBef>
-              <a:spcAft>
-                <a:spcPts val="1600"/>
-              </a:spcAft>
-              <a:buClr>
-                <a:schemeClr val="dk2"/>
-              </a:buClr>
-              <a:buSzPts val="1800"/>
-              <a:buFont typeface="Proxima Nova"/>
-              <a:buNone/>
-            </a:pPr>
-            <a:r>
-              <a:rPr b="0" i="0" lang="en" sz="1400" u="none" cap="none" strike="noStrike">
-                <a:solidFill>
-                  <a:schemeClr val="dk2"/>
-                </a:solidFill>
-                <a:latin typeface="Proxima Nova"/>
-                <a:ea typeface="Proxima Nova"/>
-                <a:cs typeface="Proxima Nova"/>
-                <a:sym typeface="Proxima Nova"/>
-              </a:rPr>
-              <a:t>w = w - learning_rate * 2 * (XTXw - XTy)</a:t>
+              <a:t/>
             </a:r>
             <a:endParaRPr b="0" i="0" sz="1400" u="none" cap="none" strike="noStrike">
               <a:solidFill>
@@ -35781,7 +35573,7 @@
         </p:blipFill>
         <p:spPr>
           <a:xfrm>
-            <a:off x="3981725" y="2340700"/>
+            <a:off x="2381525" y="2340700"/>
             <a:ext cx="2794000" cy="2235200"/>
           </a:xfrm>
           <a:prstGeom prst="rect">

</xml_diff>